<commit_message>
Semi-finalized dynamic limits section, which finally completes the whole design section
git-svn-id: https://ndnpub.parc.com/ndn-papers/NDN-SEC/dos-protection@865 df1a90cd-247b-4364-bdaf-287a704eb499
</commit_message>
<xml_diff>
--- a/figures/attack-definition.pptx
+++ b/figures/attack-definition.pptx
@@ -6,6 +6,7 @@
   </p:sldMasterIdLst>
   <p:sldIdLst>
     <p:sldId id="256" r:id="rId2"/>
+    <p:sldId id="257" r:id="rId3"/>
   </p:sldIdLst>
   <p:sldSz cx="9144000" cy="6858000" type="screen4x3"/>
   <p:notesSz cx="6858000" cy="9144000"/>
@@ -5671,6 +5672,1400 @@
     <p:extLst>
       <p:ext uri="{BB962C8B-B14F-4D97-AF65-F5344CB8AC3E}">
         <p14:creationId xmlns:p14="http://schemas.microsoft.com/office/powerpoint/2010/main" val="2635058513"/>
+      </p:ext>
+    </p:extLst>
+  </p:cSld>
+  <p:clrMapOvr>
+    <a:masterClrMapping/>
+  </p:clrMapOvr>
+</p:sld>
+</file>
+
+<file path=ppt/slides/slide2.xml><?xml version="1.0" encoding="utf-8"?>
+<p:sld xmlns:a="http://schemas.openxmlformats.org/drawingml/2006/main" xmlns:r="http://schemas.openxmlformats.org/officeDocument/2006/relationships" xmlns:p="http://schemas.openxmlformats.org/presentationml/2006/main">
+  <p:cSld>
+    <p:spTree>
+      <p:nvGrpSpPr>
+        <p:cNvPr id="1" name=""/>
+        <p:cNvGrpSpPr/>
+        <p:nvPr/>
+      </p:nvGrpSpPr>
+      <p:grpSpPr>
+        <a:xfrm>
+          <a:off x="0" y="0"/>
+          <a:ext cx="0" cy="0"/>
+          <a:chOff x="0" y="0"/>
+          <a:chExt cx="0" cy="0"/>
+        </a:xfrm>
+      </p:grpSpPr>
+      <p:sp>
+        <p:nvSpPr>
+          <p:cNvPr id="4" name="Cloud 3"/>
+          <p:cNvSpPr/>
+          <p:nvPr/>
+        </p:nvSpPr>
+        <p:spPr>
+          <a:xfrm>
+            <a:off x="2528118" y="1662232"/>
+            <a:ext cx="4644841" cy="2811739"/>
+          </a:xfrm>
+          <a:prstGeom prst="cloud">
+            <a:avLst/>
+          </a:prstGeom>
+          <a:solidFill>
+            <a:schemeClr val="bg1">
+              <a:lumMod val="85000"/>
+            </a:schemeClr>
+          </a:solidFill>
+          <a:ln w="3175" cmpd="sng">
+            <a:solidFill>
+              <a:schemeClr val="bg1">
+                <a:lumMod val="75000"/>
+              </a:schemeClr>
+            </a:solidFill>
+            <a:prstDash val="dot"/>
+          </a:ln>
+        </p:spPr>
+        <p:style>
+          <a:lnRef idx="2">
+            <a:schemeClr val="dk1"/>
+          </a:lnRef>
+          <a:fillRef idx="1">
+            <a:schemeClr val="lt1"/>
+          </a:fillRef>
+          <a:effectRef idx="0">
+            <a:schemeClr val="dk1"/>
+          </a:effectRef>
+          <a:fontRef idx="minor">
+            <a:schemeClr val="dk1"/>
+          </a:fontRef>
+        </p:style>
+        <p:txBody>
+          <a:bodyPr rtlCol="0" anchor="ctr"/>
+          <a:lstStyle/>
+          <a:p>
+            <a:pPr algn="ctr"/>
+            <a:endParaRPr lang="en-US"/>
+          </a:p>
+        </p:txBody>
+      </p:sp>
+      <p:sp>
+        <p:nvSpPr>
+          <p:cNvPr id="5" name="Oval 4"/>
+          <p:cNvSpPr/>
+          <p:nvPr/>
+        </p:nvSpPr>
+        <p:spPr>
+          <a:xfrm>
+            <a:off x="1076960" y="1692713"/>
+            <a:ext cx="802640" cy="365760"/>
+          </a:xfrm>
+          <a:prstGeom prst="ellipse">
+            <a:avLst/>
+          </a:prstGeom>
+          <a:solidFill>
+            <a:schemeClr val="accent3">
+              <a:lumMod val="60000"/>
+              <a:lumOff val="40000"/>
+            </a:schemeClr>
+          </a:solidFill>
+        </p:spPr>
+        <p:style>
+          <a:lnRef idx="2">
+            <a:schemeClr val="dk1"/>
+          </a:lnRef>
+          <a:fillRef idx="1">
+            <a:schemeClr val="lt1"/>
+          </a:fillRef>
+          <a:effectRef idx="0">
+            <a:schemeClr val="dk1"/>
+          </a:effectRef>
+          <a:fontRef idx="minor">
+            <a:schemeClr val="dk1"/>
+          </a:fontRef>
+        </p:style>
+        <p:txBody>
+          <a:bodyPr rtlCol="0" anchor="ctr"/>
+          <a:lstStyle/>
+          <a:p>
+            <a:pPr algn="ctr"/>
+            <a:endParaRPr lang="en-US" dirty="0"/>
+          </a:p>
+        </p:txBody>
+      </p:sp>
+      <p:sp>
+        <p:nvSpPr>
+          <p:cNvPr id="6" name="Oval 5"/>
+          <p:cNvSpPr/>
+          <p:nvPr/>
+        </p:nvSpPr>
+        <p:spPr>
+          <a:xfrm>
+            <a:off x="1076960" y="3717157"/>
+            <a:ext cx="802640" cy="387483"/>
+          </a:xfrm>
+          <a:prstGeom prst="ellipse">
+            <a:avLst/>
+          </a:prstGeom>
+          <a:solidFill>
+            <a:schemeClr val="accent2">
+              <a:lumMod val="60000"/>
+              <a:lumOff val="40000"/>
+            </a:schemeClr>
+          </a:solidFill>
+        </p:spPr>
+        <p:style>
+          <a:lnRef idx="2">
+            <a:schemeClr val="dk1"/>
+          </a:lnRef>
+          <a:fillRef idx="1">
+            <a:schemeClr val="lt1"/>
+          </a:fillRef>
+          <a:effectRef idx="0">
+            <a:schemeClr val="dk1"/>
+          </a:effectRef>
+          <a:fontRef idx="minor">
+            <a:schemeClr val="dk1"/>
+          </a:fontRef>
+        </p:style>
+        <p:txBody>
+          <a:bodyPr rtlCol="0" anchor="ctr"/>
+          <a:lstStyle/>
+          <a:p>
+            <a:pPr algn="ctr"/>
+            <a:endParaRPr lang="en-US"/>
+          </a:p>
+        </p:txBody>
+      </p:sp>
+      <p:sp>
+        <p:nvSpPr>
+          <p:cNvPr id="7" name="Oval 6"/>
+          <p:cNvSpPr/>
+          <p:nvPr/>
+        </p:nvSpPr>
+        <p:spPr>
+          <a:xfrm>
+            <a:off x="7762240" y="2467477"/>
+            <a:ext cx="802640" cy="336683"/>
+          </a:xfrm>
+          <a:prstGeom prst="ellipse">
+            <a:avLst/>
+          </a:prstGeom>
+          <a:solidFill>
+            <a:schemeClr val="accent1">
+              <a:lumMod val="60000"/>
+              <a:lumOff val="40000"/>
+            </a:schemeClr>
+          </a:solidFill>
+        </p:spPr>
+        <p:style>
+          <a:lnRef idx="2">
+            <a:schemeClr val="dk1"/>
+          </a:lnRef>
+          <a:fillRef idx="1">
+            <a:schemeClr val="lt1"/>
+          </a:fillRef>
+          <a:effectRef idx="0">
+            <a:schemeClr val="dk1"/>
+          </a:effectRef>
+          <a:fontRef idx="minor">
+            <a:schemeClr val="dk1"/>
+          </a:fontRef>
+        </p:style>
+        <p:txBody>
+          <a:bodyPr rtlCol="0" anchor="ctr"/>
+          <a:lstStyle/>
+          <a:p>
+            <a:pPr algn="ctr"/>
+            <a:endParaRPr lang="en-US"/>
+          </a:p>
+        </p:txBody>
+      </p:sp>
+      <p:sp>
+        <p:nvSpPr>
+          <p:cNvPr id="8" name="Rectangle 7"/>
+          <p:cNvSpPr/>
+          <p:nvPr/>
+        </p:nvSpPr>
+        <p:spPr>
+          <a:xfrm>
+            <a:off x="3291840" y="2661920"/>
+            <a:ext cx="924560" cy="608197"/>
+          </a:xfrm>
+          <a:prstGeom prst="rect">
+            <a:avLst/>
+          </a:prstGeom>
+        </p:spPr>
+        <p:style>
+          <a:lnRef idx="2">
+            <a:schemeClr val="dk1"/>
+          </a:lnRef>
+          <a:fillRef idx="1">
+            <a:schemeClr val="lt1"/>
+          </a:fillRef>
+          <a:effectRef idx="0">
+            <a:schemeClr val="dk1"/>
+          </a:effectRef>
+          <a:fontRef idx="minor">
+            <a:schemeClr val="dk1"/>
+          </a:fontRef>
+        </p:style>
+        <p:txBody>
+          <a:bodyPr rtlCol="0" anchor="ctr"/>
+          <a:lstStyle/>
+          <a:p>
+            <a:pPr algn="ctr"/>
+            <a:r>
+              <a:rPr lang="en-US" dirty="0" smtClean="0"/>
+              <a:t>NDN router </a:t>
+            </a:r>
+            <a:endParaRPr lang="en-US" dirty="0"/>
+          </a:p>
+        </p:txBody>
+      </p:sp>
+      <p:sp>
+        <p:nvSpPr>
+          <p:cNvPr id="9" name="Rectangle 8"/>
+          <p:cNvSpPr/>
+          <p:nvPr/>
+        </p:nvSpPr>
+        <p:spPr>
+          <a:xfrm>
+            <a:off x="5466080" y="2661920"/>
+            <a:ext cx="904240" cy="608197"/>
+          </a:xfrm>
+          <a:prstGeom prst="rect">
+            <a:avLst/>
+          </a:prstGeom>
+        </p:spPr>
+        <p:style>
+          <a:lnRef idx="2">
+            <a:schemeClr val="dk1"/>
+          </a:lnRef>
+          <a:fillRef idx="1">
+            <a:schemeClr val="lt1"/>
+          </a:fillRef>
+          <a:effectRef idx="0">
+            <a:schemeClr val="dk1"/>
+          </a:effectRef>
+          <a:fontRef idx="minor">
+            <a:schemeClr val="dk1"/>
+          </a:fontRef>
+        </p:style>
+        <p:txBody>
+          <a:bodyPr rtlCol="0" anchor="ctr"/>
+          <a:lstStyle/>
+          <a:p>
+            <a:pPr algn="ctr"/>
+            <a:r>
+              <a:rPr lang="en-US" dirty="0" smtClean="0"/>
+              <a:t>NDN router</a:t>
+            </a:r>
+            <a:endParaRPr lang="en-US" dirty="0"/>
+          </a:p>
+        </p:txBody>
+      </p:sp>
+      <p:sp>
+        <p:nvSpPr>
+          <p:cNvPr id="10" name="TextBox 9"/>
+          <p:cNvSpPr txBox="1"/>
+          <p:nvPr/>
+        </p:nvSpPr>
+        <p:spPr>
+          <a:xfrm>
+            <a:off x="680720" y="1993146"/>
+            <a:ext cx="1644199" cy="369332"/>
+          </a:xfrm>
+          <a:prstGeom prst="rect">
+            <a:avLst/>
+          </a:prstGeom>
+          <a:noFill/>
+        </p:spPr>
+        <p:txBody>
+          <a:bodyPr wrap="square" rtlCol="0">
+            <a:spAutoFit/>
+          </a:bodyPr>
+          <a:lstStyle/>
+          <a:p>
+            <a:r>
+              <a:rPr lang="en-US" dirty="0" smtClean="0"/>
+              <a:t>Legitimate user </a:t>
+            </a:r>
+            <a:endParaRPr lang="en-US" dirty="0"/>
+          </a:p>
+        </p:txBody>
+      </p:sp>
+      <p:sp>
+        <p:nvSpPr>
+          <p:cNvPr id="11" name="TextBox 10"/>
+          <p:cNvSpPr txBox="1"/>
+          <p:nvPr/>
+        </p:nvSpPr>
+        <p:spPr>
+          <a:xfrm>
+            <a:off x="883921" y="4104640"/>
+            <a:ext cx="1198880" cy="369332"/>
+          </a:xfrm>
+          <a:prstGeom prst="rect">
+            <a:avLst/>
+          </a:prstGeom>
+          <a:noFill/>
+        </p:spPr>
+        <p:txBody>
+          <a:bodyPr wrap="square" rtlCol="0">
+            <a:spAutoFit/>
+          </a:bodyPr>
+          <a:lstStyle/>
+          <a:p>
+            <a:r>
+              <a:rPr lang="en-US" dirty="0" smtClean="0"/>
+              <a:t>Adversary</a:t>
+            </a:r>
+            <a:endParaRPr lang="en-US" dirty="0"/>
+          </a:p>
+        </p:txBody>
+      </p:sp>
+      <p:sp>
+        <p:nvSpPr>
+          <p:cNvPr id="12" name="TextBox 11"/>
+          <p:cNvSpPr txBox="1"/>
+          <p:nvPr/>
+        </p:nvSpPr>
+        <p:spPr>
+          <a:xfrm>
+            <a:off x="7589521" y="2804160"/>
+            <a:ext cx="1198880" cy="646331"/>
+          </a:xfrm>
+          <a:prstGeom prst="rect">
+            <a:avLst/>
+          </a:prstGeom>
+          <a:noFill/>
+        </p:spPr>
+        <p:txBody>
+          <a:bodyPr wrap="square" rtlCol="0">
+            <a:spAutoFit/>
+          </a:bodyPr>
+          <a:lstStyle/>
+          <a:p>
+            <a:pPr algn="ctr"/>
+            <a:r>
+              <a:rPr lang="en-US" dirty="0" smtClean="0"/>
+              <a:t>Data producer</a:t>
+            </a:r>
+            <a:endParaRPr lang="en-US" dirty="0"/>
+          </a:p>
+        </p:txBody>
+      </p:sp>
+      <p:sp>
+        <p:nvSpPr>
+          <p:cNvPr id="16" name="Freeform 15"/>
+          <p:cNvSpPr/>
+          <p:nvPr/>
+        </p:nvSpPr>
+        <p:spPr>
+          <a:xfrm>
+            <a:off x="1859280" y="1869440"/>
+            <a:ext cx="1525126" cy="835886"/>
+          </a:xfrm>
+          <a:custGeom>
+            <a:avLst/>
+            <a:gdLst>
+              <a:gd name="connsiteX0" fmla="*/ 0 w 1525126"/>
+              <a:gd name="connsiteY0" fmla="*/ 0 h 965200"/>
+              <a:gd name="connsiteX1" fmla="*/ 670560 w 1525126"/>
+              <a:gd name="connsiteY1" fmla="*/ 121920 h 965200"/>
+              <a:gd name="connsiteX2" fmla="*/ 843280 w 1525126"/>
+              <a:gd name="connsiteY2" fmla="*/ 477520 h 965200"/>
+              <a:gd name="connsiteX3" fmla="*/ 1249680 w 1525126"/>
+              <a:gd name="connsiteY3" fmla="*/ 528320 h 965200"/>
+              <a:gd name="connsiteX4" fmla="*/ 1524000 w 1525126"/>
+              <a:gd name="connsiteY4" fmla="*/ 629920 h 965200"/>
+              <a:gd name="connsiteX5" fmla="*/ 1148080 w 1525126"/>
+              <a:gd name="connsiteY5" fmla="*/ 853440 h 965200"/>
+              <a:gd name="connsiteX6" fmla="*/ 1432560 w 1525126"/>
+              <a:gd name="connsiteY6" fmla="*/ 965200 h 965200"/>
+            </a:gdLst>
+            <a:ahLst/>
+            <a:cxnLst>
+              <a:cxn ang="0">
+                <a:pos x="connsiteX0" y="connsiteY0"/>
+              </a:cxn>
+              <a:cxn ang="0">
+                <a:pos x="connsiteX1" y="connsiteY1"/>
+              </a:cxn>
+              <a:cxn ang="0">
+                <a:pos x="connsiteX2" y="connsiteY2"/>
+              </a:cxn>
+              <a:cxn ang="0">
+                <a:pos x="connsiteX3" y="connsiteY3"/>
+              </a:cxn>
+              <a:cxn ang="0">
+                <a:pos x="connsiteX4" y="connsiteY4"/>
+              </a:cxn>
+              <a:cxn ang="0">
+                <a:pos x="connsiteX5" y="connsiteY5"/>
+              </a:cxn>
+              <a:cxn ang="0">
+                <a:pos x="connsiteX6" y="connsiteY6"/>
+              </a:cxn>
+            </a:cxnLst>
+            <a:rect l="l" t="t" r="r" b="b"/>
+            <a:pathLst>
+              <a:path w="1525126" h="965200">
+                <a:moveTo>
+                  <a:pt x="0" y="0"/>
+                </a:moveTo>
+                <a:cubicBezTo>
+                  <a:pt x="265006" y="21166"/>
+                  <a:pt x="530013" y="42333"/>
+                  <a:pt x="670560" y="121920"/>
+                </a:cubicBezTo>
+                <a:cubicBezTo>
+                  <a:pt x="811107" y="201507"/>
+                  <a:pt x="746760" y="409787"/>
+                  <a:pt x="843280" y="477520"/>
+                </a:cubicBezTo>
+                <a:cubicBezTo>
+                  <a:pt x="939800" y="545253"/>
+                  <a:pt x="1136227" y="502920"/>
+                  <a:pt x="1249680" y="528320"/>
+                </a:cubicBezTo>
+                <a:cubicBezTo>
+                  <a:pt x="1363133" y="553720"/>
+                  <a:pt x="1540933" y="575733"/>
+                  <a:pt x="1524000" y="629920"/>
+                </a:cubicBezTo>
+                <a:cubicBezTo>
+                  <a:pt x="1507067" y="684107"/>
+                  <a:pt x="1163320" y="797560"/>
+                  <a:pt x="1148080" y="853440"/>
+                </a:cubicBezTo>
+                <a:cubicBezTo>
+                  <a:pt x="1132840" y="909320"/>
+                  <a:pt x="1432560" y="965200"/>
+                  <a:pt x="1432560" y="965200"/>
+                </a:cubicBezTo>
+              </a:path>
+            </a:pathLst>
+          </a:custGeom>
+          <a:ln>
+            <a:prstDash val="lgDash"/>
+          </a:ln>
+        </p:spPr>
+        <p:style>
+          <a:lnRef idx="1">
+            <a:schemeClr val="dk1"/>
+          </a:lnRef>
+          <a:fillRef idx="0">
+            <a:schemeClr val="dk1"/>
+          </a:fillRef>
+          <a:effectRef idx="0">
+            <a:schemeClr val="dk1"/>
+          </a:effectRef>
+          <a:fontRef idx="minor">
+            <a:schemeClr val="tx1"/>
+          </a:fontRef>
+        </p:style>
+        <p:txBody>
+          <a:bodyPr rtlCol="0" anchor="ctr"/>
+          <a:lstStyle/>
+          <a:p>
+            <a:pPr algn="ctr"/>
+            <a:endParaRPr lang="en-US"/>
+          </a:p>
+        </p:txBody>
+      </p:sp>
+      <p:sp>
+        <p:nvSpPr>
+          <p:cNvPr id="17" name="Freeform 16"/>
+          <p:cNvSpPr/>
+          <p:nvPr/>
+        </p:nvSpPr>
+        <p:spPr>
+          <a:xfrm>
+            <a:off x="1859280" y="3098800"/>
+            <a:ext cx="2449545" cy="853440"/>
+          </a:xfrm>
+          <a:custGeom>
+            <a:avLst/>
+            <a:gdLst>
+              <a:gd name="connsiteX0" fmla="*/ 0 w 2449545"/>
+              <a:gd name="connsiteY0" fmla="*/ 853440 h 853440"/>
+              <a:gd name="connsiteX1" fmla="*/ 487680 w 2449545"/>
+              <a:gd name="connsiteY1" fmla="*/ 558800 h 853440"/>
+              <a:gd name="connsiteX2" fmla="*/ 1808480 w 2449545"/>
+              <a:gd name="connsiteY2" fmla="*/ 843280 h 853440"/>
+              <a:gd name="connsiteX3" fmla="*/ 2448560 w 2449545"/>
+              <a:gd name="connsiteY3" fmla="*/ 629920 h 853440"/>
+              <a:gd name="connsiteX4" fmla="*/ 1930400 w 2449545"/>
+              <a:gd name="connsiteY4" fmla="*/ 467360 h 853440"/>
+              <a:gd name="connsiteX5" fmla="*/ 1005840 w 2449545"/>
+              <a:gd name="connsiteY5" fmla="*/ 406400 h 853440"/>
+              <a:gd name="connsiteX6" fmla="*/ 995680 w 2449545"/>
+              <a:gd name="connsiteY6" fmla="*/ 71120 h 853440"/>
+              <a:gd name="connsiteX7" fmla="*/ 1442720 w 2449545"/>
+              <a:gd name="connsiteY7" fmla="*/ 0 h 853440"/>
+            </a:gdLst>
+            <a:ahLst/>
+            <a:cxnLst>
+              <a:cxn ang="0">
+                <a:pos x="connsiteX0" y="connsiteY0"/>
+              </a:cxn>
+              <a:cxn ang="0">
+                <a:pos x="connsiteX1" y="connsiteY1"/>
+              </a:cxn>
+              <a:cxn ang="0">
+                <a:pos x="connsiteX2" y="connsiteY2"/>
+              </a:cxn>
+              <a:cxn ang="0">
+                <a:pos x="connsiteX3" y="connsiteY3"/>
+              </a:cxn>
+              <a:cxn ang="0">
+                <a:pos x="connsiteX4" y="connsiteY4"/>
+              </a:cxn>
+              <a:cxn ang="0">
+                <a:pos x="connsiteX5" y="connsiteY5"/>
+              </a:cxn>
+              <a:cxn ang="0">
+                <a:pos x="connsiteX6" y="connsiteY6"/>
+              </a:cxn>
+              <a:cxn ang="0">
+                <a:pos x="connsiteX7" y="connsiteY7"/>
+              </a:cxn>
+            </a:cxnLst>
+            <a:rect l="l" t="t" r="r" b="b"/>
+            <a:pathLst>
+              <a:path w="2449545" h="853440">
+                <a:moveTo>
+                  <a:pt x="0" y="853440"/>
+                </a:moveTo>
+                <a:cubicBezTo>
+                  <a:pt x="93133" y="706966"/>
+                  <a:pt x="186267" y="560493"/>
+                  <a:pt x="487680" y="558800"/>
+                </a:cubicBezTo>
+                <a:cubicBezTo>
+                  <a:pt x="789093" y="557107"/>
+                  <a:pt x="1481667" y="831427"/>
+                  <a:pt x="1808480" y="843280"/>
+                </a:cubicBezTo>
+                <a:cubicBezTo>
+                  <a:pt x="2135293" y="855133"/>
+                  <a:pt x="2428240" y="692573"/>
+                  <a:pt x="2448560" y="629920"/>
+                </a:cubicBezTo>
+                <a:cubicBezTo>
+                  <a:pt x="2468880" y="567267"/>
+                  <a:pt x="2170853" y="504613"/>
+                  <a:pt x="1930400" y="467360"/>
+                </a:cubicBezTo>
+                <a:cubicBezTo>
+                  <a:pt x="1689947" y="430107"/>
+                  <a:pt x="1161627" y="472440"/>
+                  <a:pt x="1005840" y="406400"/>
+                </a:cubicBezTo>
+                <a:cubicBezTo>
+                  <a:pt x="850053" y="340360"/>
+                  <a:pt x="922867" y="138853"/>
+                  <a:pt x="995680" y="71120"/>
+                </a:cubicBezTo>
+                <a:cubicBezTo>
+                  <a:pt x="1068493" y="3387"/>
+                  <a:pt x="1442720" y="0"/>
+                  <a:pt x="1442720" y="0"/>
+                </a:cubicBezTo>
+              </a:path>
+            </a:pathLst>
+          </a:custGeom>
+          <a:ln>
+            <a:prstDash val="lgDash"/>
+          </a:ln>
+        </p:spPr>
+        <p:style>
+          <a:lnRef idx="1">
+            <a:schemeClr val="dk1"/>
+          </a:lnRef>
+          <a:fillRef idx="0">
+            <a:schemeClr val="dk1"/>
+          </a:fillRef>
+          <a:effectRef idx="0">
+            <a:schemeClr val="dk1"/>
+          </a:effectRef>
+          <a:fontRef idx="minor">
+            <a:schemeClr val="tx1"/>
+          </a:fontRef>
+        </p:style>
+        <p:txBody>
+          <a:bodyPr rtlCol="0" anchor="ctr"/>
+          <a:lstStyle/>
+          <a:p>
+            <a:pPr algn="ctr"/>
+            <a:endParaRPr lang="en-US"/>
+          </a:p>
+        </p:txBody>
+      </p:sp>
+      <p:sp>
+        <p:nvSpPr>
+          <p:cNvPr id="18" name="Freeform 17"/>
+          <p:cNvSpPr/>
+          <p:nvPr/>
+        </p:nvSpPr>
+        <p:spPr>
+          <a:xfrm>
+            <a:off x="6380480" y="2635108"/>
+            <a:ext cx="1371600" cy="463692"/>
+          </a:xfrm>
+          <a:custGeom>
+            <a:avLst/>
+            <a:gdLst>
+              <a:gd name="connsiteX0" fmla="*/ 0 w 1371600"/>
+              <a:gd name="connsiteY0" fmla="*/ 331612 h 688424"/>
+              <a:gd name="connsiteX1" fmla="*/ 294640 w 1371600"/>
+              <a:gd name="connsiteY1" fmla="*/ 687212 h 688424"/>
+              <a:gd name="connsiteX2" fmla="*/ 670560 w 1371600"/>
+              <a:gd name="connsiteY2" fmla="*/ 433212 h 688424"/>
+              <a:gd name="connsiteX3" fmla="*/ 995680 w 1371600"/>
+              <a:gd name="connsiteY3" fmla="*/ 47132 h 688424"/>
+              <a:gd name="connsiteX4" fmla="*/ 1371600 w 1371600"/>
+              <a:gd name="connsiteY4" fmla="*/ 6492 h 688424"/>
+            </a:gdLst>
+            <a:ahLst/>
+            <a:cxnLst>
+              <a:cxn ang="0">
+                <a:pos x="connsiteX0" y="connsiteY0"/>
+              </a:cxn>
+              <a:cxn ang="0">
+                <a:pos x="connsiteX1" y="connsiteY1"/>
+              </a:cxn>
+              <a:cxn ang="0">
+                <a:pos x="connsiteX2" y="connsiteY2"/>
+              </a:cxn>
+              <a:cxn ang="0">
+                <a:pos x="connsiteX3" y="connsiteY3"/>
+              </a:cxn>
+              <a:cxn ang="0">
+                <a:pos x="connsiteX4" y="connsiteY4"/>
+              </a:cxn>
+            </a:cxnLst>
+            <a:rect l="l" t="t" r="r" b="b"/>
+            <a:pathLst>
+              <a:path w="1371600" h="688424">
+                <a:moveTo>
+                  <a:pt x="0" y="331612"/>
+                </a:moveTo>
+                <a:cubicBezTo>
+                  <a:pt x="91440" y="500945"/>
+                  <a:pt x="182880" y="670279"/>
+                  <a:pt x="294640" y="687212"/>
+                </a:cubicBezTo>
+                <a:cubicBezTo>
+                  <a:pt x="406400" y="704145"/>
+                  <a:pt x="553720" y="539892"/>
+                  <a:pt x="670560" y="433212"/>
+                </a:cubicBezTo>
+                <a:cubicBezTo>
+                  <a:pt x="787400" y="326532"/>
+                  <a:pt x="878840" y="118252"/>
+                  <a:pt x="995680" y="47132"/>
+                </a:cubicBezTo>
+                <a:cubicBezTo>
+                  <a:pt x="1112520" y="-23988"/>
+                  <a:pt x="1371600" y="6492"/>
+                  <a:pt x="1371600" y="6492"/>
+                </a:cubicBezTo>
+              </a:path>
+            </a:pathLst>
+          </a:custGeom>
+          <a:ln>
+            <a:prstDash val="lgDash"/>
+          </a:ln>
+        </p:spPr>
+        <p:style>
+          <a:lnRef idx="1">
+            <a:schemeClr val="dk1"/>
+          </a:lnRef>
+          <a:fillRef idx="0">
+            <a:schemeClr val="dk1"/>
+          </a:fillRef>
+          <a:effectRef idx="0">
+            <a:schemeClr val="dk1"/>
+          </a:effectRef>
+          <a:fontRef idx="minor">
+            <a:schemeClr val="tx1"/>
+          </a:fontRef>
+        </p:style>
+        <p:txBody>
+          <a:bodyPr rtlCol="0" anchor="ctr"/>
+          <a:lstStyle/>
+          <a:p>
+            <a:pPr algn="ctr"/>
+            <a:endParaRPr lang="en-US"/>
+          </a:p>
+        </p:txBody>
+      </p:sp>
+      <p:cxnSp>
+        <p:nvCxnSpPr>
+          <p:cNvPr id="20" name="Straight Connector 19"/>
+          <p:cNvCxnSpPr>
+            <a:stCxn id="8" idx="3"/>
+            <a:endCxn id="9" idx="1"/>
+          </p:cNvCxnSpPr>
+          <p:nvPr/>
+        </p:nvCxnSpPr>
+        <p:spPr>
+          <a:xfrm>
+            <a:off x="4216400" y="2966019"/>
+            <a:ext cx="1249680" cy="0"/>
+          </a:xfrm>
+          <a:prstGeom prst="line">
+            <a:avLst/>
+          </a:prstGeom>
+          <a:ln w="76200" cmpd="tri"/>
+        </p:spPr>
+        <p:style>
+          <a:lnRef idx="1">
+            <a:schemeClr val="dk1"/>
+          </a:lnRef>
+          <a:fillRef idx="0">
+            <a:schemeClr val="dk1"/>
+          </a:fillRef>
+          <a:effectRef idx="0">
+            <a:schemeClr val="dk1"/>
+          </a:effectRef>
+          <a:fontRef idx="minor">
+            <a:schemeClr val="tx1"/>
+          </a:fontRef>
+        </p:style>
+      </p:cxnSp>
+      <p:sp>
+        <p:nvSpPr>
+          <p:cNvPr id="21" name="TextBox 20"/>
+          <p:cNvSpPr txBox="1"/>
+          <p:nvPr/>
+        </p:nvSpPr>
+        <p:spPr>
+          <a:xfrm>
+            <a:off x="3576320" y="3209157"/>
+            <a:ext cx="487680" cy="369332"/>
+          </a:xfrm>
+          <a:prstGeom prst="rect">
+            <a:avLst/>
+          </a:prstGeom>
+          <a:noFill/>
+        </p:spPr>
+        <p:txBody>
+          <a:bodyPr wrap="square" rtlCol="0">
+            <a:spAutoFit/>
+          </a:bodyPr>
+          <a:lstStyle/>
+          <a:p>
+            <a:r>
+              <a:rPr lang="en-US" dirty="0" smtClean="0"/>
+              <a:t>A</a:t>
+            </a:r>
+            <a:endParaRPr lang="en-US" dirty="0"/>
+          </a:p>
+        </p:txBody>
+      </p:sp>
+      <p:sp>
+        <p:nvSpPr>
+          <p:cNvPr id="22" name="TextBox 21"/>
+          <p:cNvSpPr txBox="1"/>
+          <p:nvPr/>
+        </p:nvSpPr>
+        <p:spPr>
+          <a:xfrm>
+            <a:off x="5750560" y="3214515"/>
+            <a:ext cx="487680" cy="369332"/>
+          </a:xfrm>
+          <a:prstGeom prst="rect">
+            <a:avLst/>
+          </a:prstGeom>
+          <a:noFill/>
+        </p:spPr>
+        <p:txBody>
+          <a:bodyPr wrap="square" rtlCol="0">
+            <a:spAutoFit/>
+          </a:bodyPr>
+          <a:lstStyle/>
+          <a:p>
+            <a:r>
+              <a:rPr lang="en-US" dirty="0"/>
+              <a:t>B</a:t>
+            </a:r>
+          </a:p>
+        </p:txBody>
+      </p:sp>
+      <p:sp>
+        <p:nvSpPr>
+          <p:cNvPr id="53" name="TextBox 52"/>
+          <p:cNvSpPr txBox="1"/>
+          <p:nvPr/>
+        </p:nvSpPr>
+        <p:spPr>
+          <a:xfrm>
+            <a:off x="3249506" y="2607936"/>
+            <a:ext cx="260960" cy="276999"/>
+          </a:xfrm>
+          <a:prstGeom prst="rect">
+            <a:avLst/>
+          </a:prstGeom>
+          <a:noFill/>
+        </p:spPr>
+        <p:txBody>
+          <a:bodyPr wrap="square" rtlCol="0">
+            <a:spAutoFit/>
+          </a:bodyPr>
+          <a:lstStyle/>
+          <a:p>
+            <a:r>
+              <a:rPr lang="en-US" sz="1200" dirty="0" smtClean="0">
+                <a:solidFill>
+                  <a:schemeClr val="tx2"/>
+                </a:solidFill>
+              </a:rPr>
+              <a:t>1</a:t>
+            </a:r>
+            <a:endParaRPr lang="en-US" sz="1200" dirty="0">
+              <a:solidFill>
+                <a:schemeClr val="tx2"/>
+              </a:solidFill>
+            </a:endParaRPr>
+          </a:p>
+        </p:txBody>
+      </p:sp>
+      <p:sp>
+        <p:nvSpPr>
+          <p:cNvPr id="61" name="TextBox 60"/>
+          <p:cNvSpPr txBox="1"/>
+          <p:nvPr/>
+        </p:nvSpPr>
+        <p:spPr>
+          <a:xfrm>
+            <a:off x="3239426" y="2929174"/>
+            <a:ext cx="264451" cy="276999"/>
+          </a:xfrm>
+          <a:prstGeom prst="rect">
+            <a:avLst/>
+          </a:prstGeom>
+          <a:noFill/>
+        </p:spPr>
+        <p:txBody>
+          <a:bodyPr wrap="square" rtlCol="0">
+            <a:spAutoFit/>
+          </a:bodyPr>
+          <a:lstStyle/>
+          <a:p>
+            <a:r>
+              <a:rPr lang="en-US" sz="1200" dirty="0" smtClean="0">
+                <a:solidFill>
+                  <a:schemeClr val="tx2"/>
+                </a:solidFill>
+              </a:rPr>
+              <a:t>0</a:t>
+            </a:r>
+            <a:endParaRPr lang="en-US" sz="1200" dirty="0">
+              <a:solidFill>
+                <a:schemeClr val="tx2"/>
+              </a:solidFill>
+            </a:endParaRPr>
+          </a:p>
+        </p:txBody>
+      </p:sp>
+      <p:sp>
+        <p:nvSpPr>
+          <p:cNvPr id="68" name="TextBox 67"/>
+          <p:cNvSpPr txBox="1"/>
+          <p:nvPr/>
+        </p:nvSpPr>
+        <p:spPr>
+          <a:xfrm>
+            <a:off x="4026851" y="2810630"/>
+            <a:ext cx="264451" cy="276999"/>
+          </a:xfrm>
+          <a:prstGeom prst="rect">
+            <a:avLst/>
+          </a:prstGeom>
+          <a:noFill/>
+        </p:spPr>
+        <p:txBody>
+          <a:bodyPr wrap="square" rtlCol="0">
+            <a:spAutoFit/>
+          </a:bodyPr>
+          <a:lstStyle/>
+          <a:p>
+            <a:r>
+              <a:rPr lang="en-US" sz="1200" dirty="0">
+                <a:solidFill>
+                  <a:schemeClr val="tx2"/>
+                </a:solidFill>
+              </a:rPr>
+              <a:t>2</a:t>
+            </a:r>
+            <a:endParaRPr lang="en-US" sz="1200" dirty="0">
+              <a:solidFill>
+                <a:schemeClr val="tx2"/>
+              </a:solidFill>
+            </a:endParaRPr>
+          </a:p>
+        </p:txBody>
+      </p:sp>
+      <p:sp>
+        <p:nvSpPr>
+          <p:cNvPr id="69" name="TextBox 68"/>
+          <p:cNvSpPr txBox="1"/>
+          <p:nvPr/>
+        </p:nvSpPr>
+        <p:spPr>
+          <a:xfrm>
+            <a:off x="5414365" y="2799141"/>
+            <a:ext cx="264451" cy="276999"/>
+          </a:xfrm>
+          <a:prstGeom prst="rect">
+            <a:avLst/>
+          </a:prstGeom>
+          <a:noFill/>
+        </p:spPr>
+        <p:txBody>
+          <a:bodyPr wrap="square" rtlCol="0">
+            <a:spAutoFit/>
+          </a:bodyPr>
+          <a:lstStyle/>
+          <a:p>
+            <a:r>
+              <a:rPr lang="en-US" sz="1200" dirty="0" smtClean="0">
+                <a:solidFill>
+                  <a:schemeClr val="tx2"/>
+                </a:solidFill>
+              </a:rPr>
+              <a:t>0</a:t>
+            </a:r>
+            <a:endParaRPr lang="en-US" sz="1200" dirty="0">
+              <a:solidFill>
+                <a:schemeClr val="tx2"/>
+              </a:solidFill>
+            </a:endParaRPr>
+          </a:p>
+        </p:txBody>
+      </p:sp>
+      <p:sp>
+        <p:nvSpPr>
+          <p:cNvPr id="70" name="TextBox 69"/>
+          <p:cNvSpPr txBox="1"/>
+          <p:nvPr/>
+        </p:nvSpPr>
+        <p:spPr>
+          <a:xfrm>
+            <a:off x="6170692" y="2776140"/>
+            <a:ext cx="260960" cy="276999"/>
+          </a:xfrm>
+          <a:prstGeom prst="rect">
+            <a:avLst/>
+          </a:prstGeom>
+          <a:noFill/>
+        </p:spPr>
+        <p:txBody>
+          <a:bodyPr wrap="square" rtlCol="0">
+            <a:spAutoFit/>
+          </a:bodyPr>
+          <a:lstStyle/>
+          <a:p>
+            <a:r>
+              <a:rPr lang="en-US" sz="1200" dirty="0" smtClean="0">
+                <a:solidFill>
+                  <a:schemeClr val="tx2"/>
+                </a:solidFill>
+              </a:rPr>
+              <a:t>1</a:t>
+            </a:r>
+            <a:endParaRPr lang="en-US" sz="1200" dirty="0">
+              <a:solidFill>
+                <a:schemeClr val="tx2"/>
+              </a:solidFill>
+            </a:endParaRPr>
+          </a:p>
+        </p:txBody>
+      </p:sp>
+      <p:sp>
+        <p:nvSpPr>
+          <p:cNvPr id="2" name="TextBox 1"/>
+          <p:cNvSpPr txBox="1"/>
+          <p:nvPr/>
+        </p:nvSpPr>
+        <p:spPr>
+          <a:xfrm>
+            <a:off x="4190999" y="2966019"/>
+            <a:ext cx="694267" cy="369332"/>
+          </a:xfrm>
+          <a:prstGeom prst="rect">
+            <a:avLst/>
+          </a:prstGeom>
+          <a:noFill/>
+        </p:spPr>
+        <p:txBody>
+          <a:bodyPr wrap="square" rtlCol="0">
+            <a:spAutoFit/>
+          </a:bodyPr>
+          <a:lstStyle/>
+          <a:p>
+            <a:r>
+              <a:rPr lang="en-US" dirty="0" smtClean="0">
+                <a:solidFill>
+                  <a:schemeClr val="accent3">
+                    <a:lumMod val="50000"/>
+                  </a:schemeClr>
+                </a:solidFill>
+              </a:rPr>
+              <a:t>L=3</a:t>
+            </a:r>
+            <a:endParaRPr lang="en-US" dirty="0">
+              <a:solidFill>
+                <a:schemeClr val="accent3">
+                  <a:lumMod val="50000"/>
+                </a:schemeClr>
+              </a:solidFill>
+            </a:endParaRPr>
+          </a:p>
+        </p:txBody>
+      </p:sp>
+      <p:sp>
+        <p:nvSpPr>
+          <p:cNvPr id="80" name="TextBox 79"/>
+          <p:cNvSpPr txBox="1"/>
+          <p:nvPr/>
+        </p:nvSpPr>
+        <p:spPr>
+          <a:xfrm>
+            <a:off x="6355449" y="3051122"/>
+            <a:ext cx="694267" cy="369332"/>
+          </a:xfrm>
+          <a:prstGeom prst="rect">
+            <a:avLst/>
+          </a:prstGeom>
+          <a:noFill/>
+        </p:spPr>
+        <p:txBody>
+          <a:bodyPr wrap="square" rtlCol="0">
+            <a:spAutoFit/>
+          </a:bodyPr>
+          <a:lstStyle/>
+          <a:p>
+            <a:r>
+              <a:rPr lang="en-US" dirty="0" smtClean="0">
+                <a:solidFill>
+                  <a:schemeClr val="accent3">
+                    <a:lumMod val="50000"/>
+                  </a:schemeClr>
+                </a:solidFill>
+              </a:rPr>
+              <a:t>L=10</a:t>
+            </a:r>
+          </a:p>
+        </p:txBody>
+      </p:sp>
+      <p:sp>
+        <p:nvSpPr>
+          <p:cNvPr id="81" name="TextBox 80"/>
+          <p:cNvSpPr txBox="1"/>
+          <p:nvPr/>
+        </p:nvSpPr>
+        <p:spPr>
+          <a:xfrm>
+            <a:off x="1910049" y="3717569"/>
+            <a:ext cx="694267" cy="369332"/>
+          </a:xfrm>
+          <a:prstGeom prst="rect">
+            <a:avLst/>
+          </a:prstGeom>
+          <a:noFill/>
+        </p:spPr>
+        <p:txBody>
+          <a:bodyPr wrap="square" rtlCol="0">
+            <a:spAutoFit/>
+          </a:bodyPr>
+          <a:lstStyle/>
+          <a:p>
+            <a:r>
+              <a:rPr lang="en-US" dirty="0" smtClean="0">
+                <a:solidFill>
+                  <a:schemeClr val="accent3">
+                    <a:lumMod val="50000"/>
+                  </a:schemeClr>
+                </a:solidFill>
+              </a:rPr>
+              <a:t>L=0</a:t>
+            </a:r>
+            <a:endParaRPr lang="en-US" dirty="0">
+              <a:solidFill>
+                <a:schemeClr val="accent3">
+                  <a:lumMod val="50000"/>
+                </a:schemeClr>
+              </a:solidFill>
+            </a:endParaRPr>
+          </a:p>
+        </p:txBody>
+      </p:sp>
+      <p:sp>
+        <p:nvSpPr>
+          <p:cNvPr id="82" name="TextBox 81"/>
+          <p:cNvSpPr txBox="1"/>
+          <p:nvPr/>
+        </p:nvSpPr>
+        <p:spPr>
+          <a:xfrm>
+            <a:off x="1854199" y="1509354"/>
+            <a:ext cx="1820334" cy="369332"/>
+          </a:xfrm>
+          <a:prstGeom prst="rect">
+            <a:avLst/>
+          </a:prstGeom>
+          <a:noFill/>
+        </p:spPr>
+        <p:txBody>
+          <a:bodyPr wrap="square" rtlCol="0">
+            <a:spAutoFit/>
+          </a:bodyPr>
+          <a:lstStyle/>
+          <a:p>
+            <a:r>
+              <a:rPr lang="en-US" dirty="0" smtClean="0">
+                <a:solidFill>
+                  <a:schemeClr val="accent3">
+                    <a:lumMod val="50000"/>
+                  </a:schemeClr>
+                </a:solidFill>
+              </a:rPr>
+              <a:t>L=1.5</a:t>
+            </a:r>
+          </a:p>
+        </p:txBody>
+      </p:sp>
+      <p:cxnSp>
+        <p:nvCxnSpPr>
+          <p:cNvPr id="13" name="Straight Arrow Connector 12"/>
+          <p:cNvCxnSpPr/>
+          <p:nvPr/>
+        </p:nvCxnSpPr>
+        <p:spPr>
+          <a:xfrm flipH="1">
+            <a:off x="4817533" y="2710291"/>
+            <a:ext cx="596832" cy="0"/>
+          </a:xfrm>
+          <a:prstGeom prst="straightConnector1">
+            <a:avLst/>
+          </a:prstGeom>
+          <a:ln w="38100" cmpd="dbl">
+            <a:solidFill>
+              <a:schemeClr val="tx2"/>
+            </a:solidFill>
+            <a:tailEnd type="arrow"/>
+          </a:ln>
+        </p:spPr>
+        <p:style>
+          <a:lnRef idx="1">
+            <a:schemeClr val="accent1"/>
+          </a:lnRef>
+          <a:fillRef idx="0">
+            <a:schemeClr val="accent1"/>
+          </a:fillRef>
+          <a:effectRef idx="0">
+            <a:schemeClr val="accent1"/>
+          </a:effectRef>
+          <a:fontRef idx="minor">
+            <a:schemeClr val="tx1"/>
+          </a:fontRef>
+        </p:style>
+      </p:cxnSp>
+      <p:sp>
+        <p:nvSpPr>
+          <p:cNvPr id="14" name="TextBox 13"/>
+          <p:cNvSpPr txBox="1"/>
+          <p:nvPr/>
+        </p:nvSpPr>
+        <p:spPr>
+          <a:xfrm>
+            <a:off x="4403417" y="2308051"/>
+            <a:ext cx="1820334" cy="369332"/>
+          </a:xfrm>
+          <a:prstGeom prst="rect">
+            <a:avLst/>
+          </a:prstGeom>
+          <a:noFill/>
+        </p:spPr>
+        <p:txBody>
+          <a:bodyPr wrap="square" rtlCol="0">
+            <a:spAutoFit/>
+          </a:bodyPr>
+          <a:lstStyle/>
+          <a:p>
+            <a:r>
+              <a:rPr lang="en-US" dirty="0" smtClean="0">
+                <a:solidFill>
+                  <a:schemeClr val="tx2"/>
+                </a:solidFill>
+              </a:rPr>
+              <a:t>L’=30% x 10 = 3</a:t>
+            </a:r>
+            <a:endParaRPr lang="en-US" dirty="0">
+              <a:solidFill>
+                <a:schemeClr val="tx2"/>
+              </a:solidFill>
+            </a:endParaRPr>
+          </a:p>
+        </p:txBody>
+      </p:sp>
+      <p:cxnSp>
+        <p:nvCxnSpPr>
+          <p:cNvPr id="85" name="Straight Arrow Connector 84"/>
+          <p:cNvCxnSpPr/>
+          <p:nvPr/>
+        </p:nvCxnSpPr>
+        <p:spPr>
+          <a:xfrm flipH="1" flipV="1">
+            <a:off x="3132667" y="2133600"/>
+            <a:ext cx="443654" cy="333877"/>
+          </a:xfrm>
+          <a:prstGeom prst="straightConnector1">
+            <a:avLst/>
+          </a:prstGeom>
+          <a:ln w="38100" cmpd="dbl">
+            <a:solidFill>
+              <a:schemeClr val="tx2"/>
+            </a:solidFill>
+            <a:tailEnd type="arrow"/>
+          </a:ln>
+        </p:spPr>
+        <p:style>
+          <a:lnRef idx="1">
+            <a:schemeClr val="accent1"/>
+          </a:lnRef>
+          <a:fillRef idx="0">
+            <a:schemeClr val="accent1"/>
+          </a:fillRef>
+          <a:effectRef idx="0">
+            <a:schemeClr val="accent1"/>
+          </a:effectRef>
+          <a:fontRef idx="minor">
+            <a:schemeClr val="tx1"/>
+          </a:fontRef>
+        </p:style>
+      </p:cxnSp>
+      <p:sp>
+        <p:nvSpPr>
+          <p:cNvPr id="86" name="TextBox 85"/>
+          <p:cNvSpPr txBox="1"/>
+          <p:nvPr/>
+        </p:nvSpPr>
+        <p:spPr>
+          <a:xfrm>
+            <a:off x="2975751" y="1808480"/>
+            <a:ext cx="1780182" cy="369332"/>
+          </a:xfrm>
+          <a:prstGeom prst="rect">
+            <a:avLst/>
+          </a:prstGeom>
+          <a:noFill/>
+        </p:spPr>
+        <p:txBody>
+          <a:bodyPr wrap="square" rtlCol="0">
+            <a:spAutoFit/>
+          </a:bodyPr>
+          <a:lstStyle/>
+          <a:p>
+            <a:r>
+              <a:rPr lang="en-US" dirty="0" smtClean="0">
+                <a:solidFill>
+                  <a:schemeClr val="tx2"/>
+                </a:solidFill>
+              </a:rPr>
+              <a:t>L’=50% x 3 = 1.5</a:t>
+            </a:r>
+            <a:endParaRPr lang="en-US" dirty="0">
+              <a:solidFill>
+                <a:schemeClr val="tx2"/>
+              </a:solidFill>
+            </a:endParaRPr>
+          </a:p>
+        </p:txBody>
+      </p:sp>
+      <p:cxnSp>
+        <p:nvCxnSpPr>
+          <p:cNvPr id="87" name="Straight Arrow Connector 86"/>
+          <p:cNvCxnSpPr/>
+          <p:nvPr/>
+        </p:nvCxnSpPr>
+        <p:spPr>
+          <a:xfrm flipH="1">
+            <a:off x="2528118" y="3011303"/>
+            <a:ext cx="534500" cy="258814"/>
+          </a:xfrm>
+          <a:prstGeom prst="straightConnector1">
+            <a:avLst/>
+          </a:prstGeom>
+          <a:ln w="38100" cmpd="dbl">
+            <a:solidFill>
+              <a:schemeClr val="tx2"/>
+            </a:solidFill>
+            <a:tailEnd type="arrow"/>
+          </a:ln>
+        </p:spPr>
+        <p:style>
+          <a:lnRef idx="1">
+            <a:schemeClr val="accent1"/>
+          </a:lnRef>
+          <a:fillRef idx="0">
+            <a:schemeClr val="accent1"/>
+          </a:fillRef>
+          <a:effectRef idx="0">
+            <a:schemeClr val="accent1"/>
+          </a:effectRef>
+          <a:fontRef idx="minor">
+            <a:schemeClr val="tx1"/>
+          </a:fontRef>
+        </p:style>
+      </p:cxnSp>
+      <p:sp>
+        <p:nvSpPr>
+          <p:cNvPr id="88" name="TextBox 87"/>
+          <p:cNvSpPr txBox="1"/>
+          <p:nvPr/>
+        </p:nvSpPr>
+        <p:spPr>
+          <a:xfrm>
+            <a:off x="2220149" y="2785346"/>
+            <a:ext cx="755602" cy="369332"/>
+          </a:xfrm>
+          <a:prstGeom prst="rect">
+            <a:avLst/>
+          </a:prstGeom>
+          <a:noFill/>
+        </p:spPr>
+        <p:txBody>
+          <a:bodyPr wrap="square" rtlCol="0">
+            <a:spAutoFit/>
+          </a:bodyPr>
+          <a:lstStyle/>
+          <a:p>
+            <a:r>
+              <a:rPr lang="en-US" dirty="0" smtClean="0">
+                <a:solidFill>
+                  <a:schemeClr val="tx2"/>
+                </a:solidFill>
+              </a:rPr>
+              <a:t>L’=0</a:t>
+            </a:r>
+            <a:endParaRPr lang="en-US" dirty="0">
+              <a:solidFill>
+                <a:schemeClr val="tx2"/>
+              </a:solidFill>
+            </a:endParaRPr>
+          </a:p>
+        </p:txBody>
+      </p:sp>
+    </p:spTree>
+    <p:extLst>
+      <p:ext uri="{BB962C8B-B14F-4D97-AF65-F5344CB8AC3E}">
+        <p14:creationId xmlns:p14="http://schemas.microsoft.com/office/powerpoint/2010/main" val="910189549"/>
       </p:ext>
     </p:extLst>
   </p:cSld>

</xml_diff>

<commit_message>
Most of the evaluation section is semi-done.  I suspect I put too much details and discussion in the evalutions... Not sure
git-svn-id: https://ndnpub.parc.com/ndn-papers/NDN-SEC/dos-protection@871 df1a90cd-247b-4364-bdaf-287a704eb499
</commit_message>
<xml_diff>
--- a/figures/attack-definition.pptx
+++ b/figures/attack-definition.pptx
@@ -7,6 +7,7 @@
   <p:sldIdLst>
     <p:sldId id="256" r:id="rId2"/>
     <p:sldId id="257" r:id="rId3"/>
+    <p:sldId id="258" r:id="rId4"/>
   </p:sldIdLst>
   <p:sldSz cx="9144000" cy="6858000" type="screen4x3"/>
   <p:notesSz cx="6858000" cy="9144000"/>
@@ -289,7 +290,7 @@
           <a:p>
             <a:fld id="{2AB08261-BEC8-C743-9AA1-4C172E22B180}" type="datetimeFigureOut">
               <a:rPr lang="en-US" smtClean="0"/>
-              <a:t>12/5/12</a:t>
+              <a:t>12/7/12</a:t>
             </a:fld>
             <a:endParaRPr lang="en-US"/>
           </a:p>
@@ -459,7 +460,7 @@
           <a:p>
             <a:fld id="{7E7C9DB5-1AAC-2845-9DA6-AB6D224A9081}" type="datetime1">
               <a:rPr lang="en-US" smtClean="0"/>
-              <a:t>12/5/12</a:t>
+              <a:t>12/7/12</a:t>
             </a:fld>
             <a:endParaRPr lang="en-US"/>
           </a:p>
@@ -641,7 +642,7 @@
           <a:p>
             <a:fld id="{7E7C9DB5-1AAC-2845-9DA6-AB6D224A9081}" type="datetime1">
               <a:rPr lang="en-US" smtClean="0"/>
-              <a:t>12/5/12</a:t>
+              <a:t>12/7/12</a:t>
             </a:fld>
             <a:endParaRPr lang="en-US"/>
           </a:p>
@@ -823,7 +824,7 @@
           <a:p>
             <a:fld id="{EDFDBB04-F604-8941-9838-B78692AD20F6}" type="datetime1">
               <a:rPr lang="en-US" smtClean="0"/>
-              <a:t>12/5/12</a:t>
+              <a:t>12/7/12</a:t>
             </a:fld>
             <a:endParaRPr lang="en-US"/>
           </a:p>
@@ -1043,7 +1044,7 @@
           <a:p>
             <a:fld id="{7AE2D53A-CB95-C94F-A579-C1ABDC51EF4B}" type="datetime1">
               <a:rPr lang="en-US" smtClean="0"/>
-              <a:t>12/5/12</a:t>
+              <a:t>12/7/12</a:t>
             </a:fld>
             <a:endParaRPr lang="en-US"/>
           </a:p>
@@ -1317,7 +1318,7 @@
           <a:p>
             <a:fld id="{EDFDBB04-F604-8941-9838-B78692AD20F6}" type="datetime1">
               <a:rPr lang="en-US" smtClean="0"/>
-              <a:t>12/5/12</a:t>
+              <a:t>12/7/12</a:t>
             </a:fld>
             <a:endParaRPr lang="en-US"/>
           </a:p>
@@ -1563,7 +1564,7 @@
           <a:p>
             <a:fld id="{2AB08261-BEC8-C743-9AA1-4C172E22B180}" type="datetimeFigureOut">
               <a:rPr lang="en-US" smtClean="0"/>
-              <a:t>12/5/12</a:t>
+              <a:t>12/7/12</a:t>
             </a:fld>
             <a:endParaRPr lang="en-US"/>
           </a:p>
@@ -1851,7 +1852,7 @@
           <a:p>
             <a:fld id="{3AD07F4D-D3D5-1048-9616-FC9F456D94C2}" type="datetime1">
               <a:rPr lang="en-US" smtClean="0"/>
-              <a:t>12/5/12</a:t>
+              <a:t>12/7/12</a:t>
             </a:fld>
             <a:endParaRPr lang="en-US"/>
           </a:p>
@@ -2273,7 +2274,7 @@
           <a:p>
             <a:fld id="{4DEC9BEA-1153-5146-A4CE-0CB2C6FB3BF4}" type="datetime1">
               <a:rPr lang="en-US" smtClean="0"/>
-              <a:t>12/5/12</a:t>
+              <a:t>12/7/12</a:t>
             </a:fld>
             <a:endParaRPr lang="en-US"/>
           </a:p>
@@ -2391,7 +2392,7 @@
           <a:p>
             <a:fld id="{578ED6B0-AF1F-8644-BFFA-EF298EB088D5}" type="datetime1">
               <a:rPr lang="en-US" smtClean="0"/>
-              <a:t>12/5/12</a:t>
+              <a:t>12/7/12</a:t>
             </a:fld>
             <a:endParaRPr lang="en-US"/>
           </a:p>
@@ -2486,7 +2487,7 @@
           <a:p>
             <a:fld id="{2AB08261-BEC8-C743-9AA1-4C172E22B180}" type="datetimeFigureOut">
               <a:rPr lang="en-US" smtClean="0"/>
-              <a:t>12/5/12</a:t>
+              <a:t>12/7/12</a:t>
             </a:fld>
             <a:endParaRPr lang="en-US"/>
           </a:p>
@@ -2763,7 +2764,7 @@
           <a:p>
             <a:fld id="{7AE2D53A-CB95-C94F-A579-C1ABDC51EF4B}" type="datetime1">
               <a:rPr lang="en-US" smtClean="0"/>
-              <a:t>12/5/12</a:t>
+              <a:t>12/7/12</a:t>
             </a:fld>
             <a:endParaRPr lang="en-US"/>
           </a:p>
@@ -3016,7 +3017,7 @@
           <a:p>
             <a:fld id="{0017E4CD-3096-AD4E-A6FB-80337FCBF504}" type="datetime1">
               <a:rPr lang="en-US" smtClean="0"/>
-              <a:t>12/5/12</a:t>
+              <a:t>12/7/12</a:t>
             </a:fld>
             <a:endParaRPr lang="en-US"/>
           </a:p>
@@ -3229,7 +3230,7 @@
           <a:p>
             <a:fld id="{7E7C9DB5-1AAC-2845-9DA6-AB6D224A9081}" type="datetime1">
               <a:rPr lang="en-US" smtClean="0"/>
-              <a:t>12/5/12</a:t>
+              <a:t>12/7/12</a:t>
             </a:fld>
             <a:endParaRPr lang="en-US"/>
           </a:p>
@@ -6602,11 +6603,6 @@
               </a:rPr>
               <a:t>2</a:t>
             </a:r>
-            <a:endParaRPr lang="en-US" sz="1200" dirty="0">
-              <a:solidFill>
-                <a:schemeClr val="tx2"/>
-              </a:solidFill>
-            </a:endParaRPr>
           </a:p>
         </p:txBody>
       </p:sp>
@@ -7066,6 +7062,1034 @@
     <p:extLst>
       <p:ext uri="{BB962C8B-B14F-4D97-AF65-F5344CB8AC3E}">
         <p14:creationId xmlns:p14="http://schemas.microsoft.com/office/powerpoint/2010/main" val="910189549"/>
+      </p:ext>
+    </p:extLst>
+  </p:cSld>
+  <p:clrMapOvr>
+    <a:masterClrMapping/>
+  </p:clrMapOvr>
+</p:sld>
+</file>
+
+<file path=ppt/slides/slide3.xml><?xml version="1.0" encoding="utf-8"?>
+<p:sld xmlns:a="http://schemas.openxmlformats.org/drawingml/2006/main" xmlns:r="http://schemas.openxmlformats.org/officeDocument/2006/relationships" xmlns:p="http://schemas.openxmlformats.org/presentationml/2006/main">
+  <p:cSld>
+    <p:spTree>
+      <p:nvGrpSpPr>
+        <p:cNvPr id="1" name=""/>
+        <p:cNvGrpSpPr/>
+        <p:nvPr/>
+      </p:nvGrpSpPr>
+      <p:grpSpPr>
+        <a:xfrm>
+          <a:off x="0" y="0"/>
+          <a:ext cx="0" cy="0"/>
+          <a:chOff x="0" y="0"/>
+          <a:chExt cx="0" cy="0"/>
+        </a:xfrm>
+      </p:grpSpPr>
+      <p:sp>
+        <p:nvSpPr>
+          <p:cNvPr id="5" name="Oval 4"/>
+          <p:cNvSpPr/>
+          <p:nvPr/>
+        </p:nvSpPr>
+        <p:spPr>
+          <a:xfrm>
+            <a:off x="1485628" y="1559932"/>
+            <a:ext cx="802640" cy="365760"/>
+          </a:xfrm>
+          <a:prstGeom prst="ellipse">
+            <a:avLst/>
+          </a:prstGeom>
+          <a:solidFill>
+            <a:schemeClr val="accent3">
+              <a:lumMod val="60000"/>
+              <a:lumOff val="40000"/>
+            </a:schemeClr>
+          </a:solidFill>
+        </p:spPr>
+        <p:style>
+          <a:lnRef idx="2">
+            <a:schemeClr val="dk1"/>
+          </a:lnRef>
+          <a:fillRef idx="1">
+            <a:schemeClr val="lt1"/>
+          </a:fillRef>
+          <a:effectRef idx="0">
+            <a:schemeClr val="dk1"/>
+          </a:effectRef>
+          <a:fontRef idx="minor">
+            <a:schemeClr val="dk1"/>
+          </a:fontRef>
+        </p:style>
+        <p:txBody>
+          <a:bodyPr rtlCol="0" anchor="ctr"/>
+          <a:lstStyle/>
+          <a:p>
+            <a:pPr algn="ctr"/>
+            <a:endParaRPr lang="en-US" dirty="0"/>
+          </a:p>
+        </p:txBody>
+      </p:sp>
+      <p:sp>
+        <p:nvSpPr>
+          <p:cNvPr id="6" name="Oval 5"/>
+          <p:cNvSpPr/>
+          <p:nvPr/>
+        </p:nvSpPr>
+        <p:spPr>
+          <a:xfrm>
+            <a:off x="1505567" y="3699095"/>
+            <a:ext cx="802640" cy="387483"/>
+          </a:xfrm>
+          <a:prstGeom prst="ellipse">
+            <a:avLst/>
+          </a:prstGeom>
+          <a:solidFill>
+            <a:schemeClr val="accent2">
+              <a:lumMod val="60000"/>
+              <a:lumOff val="40000"/>
+            </a:schemeClr>
+          </a:solidFill>
+        </p:spPr>
+        <p:style>
+          <a:lnRef idx="2">
+            <a:schemeClr val="dk1"/>
+          </a:lnRef>
+          <a:fillRef idx="1">
+            <a:schemeClr val="lt1"/>
+          </a:fillRef>
+          <a:effectRef idx="0">
+            <a:schemeClr val="dk1"/>
+          </a:effectRef>
+          <a:fontRef idx="minor">
+            <a:schemeClr val="dk1"/>
+          </a:fontRef>
+        </p:style>
+        <p:txBody>
+          <a:bodyPr rtlCol="0" anchor="ctr"/>
+          <a:lstStyle/>
+          <a:p>
+            <a:pPr algn="ctr"/>
+            <a:endParaRPr lang="en-US"/>
+          </a:p>
+        </p:txBody>
+      </p:sp>
+      <p:sp>
+        <p:nvSpPr>
+          <p:cNvPr id="8" name="Rectangle 7"/>
+          <p:cNvSpPr/>
+          <p:nvPr/>
+        </p:nvSpPr>
+        <p:spPr>
+          <a:xfrm>
+            <a:off x="5391960" y="2529139"/>
+            <a:ext cx="924560" cy="608197"/>
+          </a:xfrm>
+          <a:prstGeom prst="rect">
+            <a:avLst/>
+          </a:prstGeom>
+        </p:spPr>
+        <p:style>
+          <a:lnRef idx="2">
+            <a:schemeClr val="dk1"/>
+          </a:lnRef>
+          <a:fillRef idx="1">
+            <a:schemeClr val="lt1"/>
+          </a:fillRef>
+          <a:effectRef idx="0">
+            <a:schemeClr val="dk1"/>
+          </a:effectRef>
+          <a:fontRef idx="minor">
+            <a:schemeClr val="dk1"/>
+          </a:fontRef>
+        </p:style>
+        <p:txBody>
+          <a:bodyPr rtlCol="0" anchor="ctr"/>
+          <a:lstStyle/>
+          <a:p>
+            <a:pPr algn="ctr"/>
+            <a:r>
+              <a:rPr lang="en-US" dirty="0" smtClean="0"/>
+              <a:t>NDN router </a:t>
+            </a:r>
+            <a:endParaRPr lang="en-US" dirty="0"/>
+          </a:p>
+        </p:txBody>
+      </p:sp>
+      <p:sp>
+        <p:nvSpPr>
+          <p:cNvPr id="10" name="TextBox 9"/>
+          <p:cNvSpPr txBox="1"/>
+          <p:nvPr/>
+        </p:nvSpPr>
+        <p:spPr>
+          <a:xfrm>
+            <a:off x="1044123" y="1884312"/>
+            <a:ext cx="1644199" cy="369332"/>
+          </a:xfrm>
+          <a:prstGeom prst="rect">
+            <a:avLst/>
+          </a:prstGeom>
+          <a:noFill/>
+        </p:spPr>
+        <p:txBody>
+          <a:bodyPr wrap="square" rtlCol="0">
+            <a:spAutoFit/>
+          </a:bodyPr>
+          <a:lstStyle/>
+          <a:p>
+            <a:r>
+              <a:rPr lang="en-US" dirty="0" smtClean="0"/>
+              <a:t>Legitimate user </a:t>
+            </a:r>
+            <a:endParaRPr lang="en-US" dirty="0"/>
+          </a:p>
+        </p:txBody>
+      </p:sp>
+      <p:sp>
+        <p:nvSpPr>
+          <p:cNvPr id="11" name="TextBox 10"/>
+          <p:cNvSpPr txBox="1"/>
+          <p:nvPr/>
+        </p:nvSpPr>
+        <p:spPr>
+          <a:xfrm>
+            <a:off x="1312528" y="4086578"/>
+            <a:ext cx="1198880" cy="369332"/>
+          </a:xfrm>
+          <a:prstGeom prst="rect">
+            <a:avLst/>
+          </a:prstGeom>
+          <a:noFill/>
+        </p:spPr>
+        <p:txBody>
+          <a:bodyPr wrap="square" rtlCol="0">
+            <a:spAutoFit/>
+          </a:bodyPr>
+          <a:lstStyle/>
+          <a:p>
+            <a:r>
+              <a:rPr lang="en-US" dirty="0" smtClean="0"/>
+              <a:t>Adversary</a:t>
+            </a:r>
+            <a:endParaRPr lang="en-US" dirty="0"/>
+          </a:p>
+        </p:txBody>
+      </p:sp>
+      <p:sp>
+        <p:nvSpPr>
+          <p:cNvPr id="16" name="Freeform 15"/>
+          <p:cNvSpPr/>
+          <p:nvPr/>
+        </p:nvSpPr>
+        <p:spPr>
+          <a:xfrm>
+            <a:off x="3959400" y="1736659"/>
+            <a:ext cx="1525126" cy="835886"/>
+          </a:xfrm>
+          <a:custGeom>
+            <a:avLst/>
+            <a:gdLst>
+              <a:gd name="connsiteX0" fmla="*/ 0 w 1525126"/>
+              <a:gd name="connsiteY0" fmla="*/ 0 h 965200"/>
+              <a:gd name="connsiteX1" fmla="*/ 670560 w 1525126"/>
+              <a:gd name="connsiteY1" fmla="*/ 121920 h 965200"/>
+              <a:gd name="connsiteX2" fmla="*/ 843280 w 1525126"/>
+              <a:gd name="connsiteY2" fmla="*/ 477520 h 965200"/>
+              <a:gd name="connsiteX3" fmla="*/ 1249680 w 1525126"/>
+              <a:gd name="connsiteY3" fmla="*/ 528320 h 965200"/>
+              <a:gd name="connsiteX4" fmla="*/ 1524000 w 1525126"/>
+              <a:gd name="connsiteY4" fmla="*/ 629920 h 965200"/>
+              <a:gd name="connsiteX5" fmla="*/ 1148080 w 1525126"/>
+              <a:gd name="connsiteY5" fmla="*/ 853440 h 965200"/>
+              <a:gd name="connsiteX6" fmla="*/ 1432560 w 1525126"/>
+              <a:gd name="connsiteY6" fmla="*/ 965200 h 965200"/>
+            </a:gdLst>
+            <a:ahLst/>
+            <a:cxnLst>
+              <a:cxn ang="0">
+                <a:pos x="connsiteX0" y="connsiteY0"/>
+              </a:cxn>
+              <a:cxn ang="0">
+                <a:pos x="connsiteX1" y="connsiteY1"/>
+              </a:cxn>
+              <a:cxn ang="0">
+                <a:pos x="connsiteX2" y="connsiteY2"/>
+              </a:cxn>
+              <a:cxn ang="0">
+                <a:pos x="connsiteX3" y="connsiteY3"/>
+              </a:cxn>
+              <a:cxn ang="0">
+                <a:pos x="connsiteX4" y="connsiteY4"/>
+              </a:cxn>
+              <a:cxn ang="0">
+                <a:pos x="connsiteX5" y="connsiteY5"/>
+              </a:cxn>
+              <a:cxn ang="0">
+                <a:pos x="connsiteX6" y="connsiteY6"/>
+              </a:cxn>
+            </a:cxnLst>
+            <a:rect l="l" t="t" r="r" b="b"/>
+            <a:pathLst>
+              <a:path w="1525126" h="965200">
+                <a:moveTo>
+                  <a:pt x="0" y="0"/>
+                </a:moveTo>
+                <a:cubicBezTo>
+                  <a:pt x="265006" y="21166"/>
+                  <a:pt x="530013" y="42333"/>
+                  <a:pt x="670560" y="121920"/>
+                </a:cubicBezTo>
+                <a:cubicBezTo>
+                  <a:pt x="811107" y="201507"/>
+                  <a:pt x="746760" y="409787"/>
+                  <a:pt x="843280" y="477520"/>
+                </a:cubicBezTo>
+                <a:cubicBezTo>
+                  <a:pt x="939800" y="545253"/>
+                  <a:pt x="1136227" y="502920"/>
+                  <a:pt x="1249680" y="528320"/>
+                </a:cubicBezTo>
+                <a:cubicBezTo>
+                  <a:pt x="1363133" y="553720"/>
+                  <a:pt x="1540933" y="575733"/>
+                  <a:pt x="1524000" y="629920"/>
+                </a:cubicBezTo>
+                <a:cubicBezTo>
+                  <a:pt x="1507067" y="684107"/>
+                  <a:pt x="1163320" y="797560"/>
+                  <a:pt x="1148080" y="853440"/>
+                </a:cubicBezTo>
+                <a:cubicBezTo>
+                  <a:pt x="1132840" y="909320"/>
+                  <a:pt x="1432560" y="965200"/>
+                  <a:pt x="1432560" y="965200"/>
+                </a:cubicBezTo>
+              </a:path>
+            </a:pathLst>
+          </a:custGeom>
+          <a:ln>
+            <a:prstDash val="lgDash"/>
+          </a:ln>
+        </p:spPr>
+        <p:style>
+          <a:lnRef idx="1">
+            <a:schemeClr val="dk1"/>
+          </a:lnRef>
+          <a:fillRef idx="0">
+            <a:schemeClr val="dk1"/>
+          </a:fillRef>
+          <a:effectRef idx="0">
+            <a:schemeClr val="dk1"/>
+          </a:effectRef>
+          <a:fontRef idx="minor">
+            <a:schemeClr val="tx1"/>
+          </a:fontRef>
+        </p:style>
+        <p:txBody>
+          <a:bodyPr rtlCol="0" anchor="ctr"/>
+          <a:lstStyle/>
+          <a:p>
+            <a:pPr algn="ctr"/>
+            <a:endParaRPr lang="en-US"/>
+          </a:p>
+        </p:txBody>
+      </p:sp>
+      <p:sp>
+        <p:nvSpPr>
+          <p:cNvPr id="17" name="Freeform 16"/>
+          <p:cNvSpPr/>
+          <p:nvPr/>
+        </p:nvSpPr>
+        <p:spPr>
+          <a:xfrm>
+            <a:off x="3959400" y="2966019"/>
+            <a:ext cx="2449545" cy="853440"/>
+          </a:xfrm>
+          <a:custGeom>
+            <a:avLst/>
+            <a:gdLst>
+              <a:gd name="connsiteX0" fmla="*/ 0 w 2449545"/>
+              <a:gd name="connsiteY0" fmla="*/ 853440 h 853440"/>
+              <a:gd name="connsiteX1" fmla="*/ 487680 w 2449545"/>
+              <a:gd name="connsiteY1" fmla="*/ 558800 h 853440"/>
+              <a:gd name="connsiteX2" fmla="*/ 1808480 w 2449545"/>
+              <a:gd name="connsiteY2" fmla="*/ 843280 h 853440"/>
+              <a:gd name="connsiteX3" fmla="*/ 2448560 w 2449545"/>
+              <a:gd name="connsiteY3" fmla="*/ 629920 h 853440"/>
+              <a:gd name="connsiteX4" fmla="*/ 1930400 w 2449545"/>
+              <a:gd name="connsiteY4" fmla="*/ 467360 h 853440"/>
+              <a:gd name="connsiteX5" fmla="*/ 1005840 w 2449545"/>
+              <a:gd name="connsiteY5" fmla="*/ 406400 h 853440"/>
+              <a:gd name="connsiteX6" fmla="*/ 995680 w 2449545"/>
+              <a:gd name="connsiteY6" fmla="*/ 71120 h 853440"/>
+              <a:gd name="connsiteX7" fmla="*/ 1442720 w 2449545"/>
+              <a:gd name="connsiteY7" fmla="*/ 0 h 853440"/>
+            </a:gdLst>
+            <a:ahLst/>
+            <a:cxnLst>
+              <a:cxn ang="0">
+                <a:pos x="connsiteX0" y="connsiteY0"/>
+              </a:cxn>
+              <a:cxn ang="0">
+                <a:pos x="connsiteX1" y="connsiteY1"/>
+              </a:cxn>
+              <a:cxn ang="0">
+                <a:pos x="connsiteX2" y="connsiteY2"/>
+              </a:cxn>
+              <a:cxn ang="0">
+                <a:pos x="connsiteX3" y="connsiteY3"/>
+              </a:cxn>
+              <a:cxn ang="0">
+                <a:pos x="connsiteX4" y="connsiteY4"/>
+              </a:cxn>
+              <a:cxn ang="0">
+                <a:pos x="connsiteX5" y="connsiteY5"/>
+              </a:cxn>
+              <a:cxn ang="0">
+                <a:pos x="connsiteX6" y="connsiteY6"/>
+              </a:cxn>
+              <a:cxn ang="0">
+                <a:pos x="connsiteX7" y="connsiteY7"/>
+              </a:cxn>
+            </a:cxnLst>
+            <a:rect l="l" t="t" r="r" b="b"/>
+            <a:pathLst>
+              <a:path w="2449545" h="853440">
+                <a:moveTo>
+                  <a:pt x="0" y="853440"/>
+                </a:moveTo>
+                <a:cubicBezTo>
+                  <a:pt x="93133" y="706966"/>
+                  <a:pt x="186267" y="560493"/>
+                  <a:pt x="487680" y="558800"/>
+                </a:cubicBezTo>
+                <a:cubicBezTo>
+                  <a:pt x="789093" y="557107"/>
+                  <a:pt x="1481667" y="831427"/>
+                  <a:pt x="1808480" y="843280"/>
+                </a:cubicBezTo>
+                <a:cubicBezTo>
+                  <a:pt x="2135293" y="855133"/>
+                  <a:pt x="2428240" y="692573"/>
+                  <a:pt x="2448560" y="629920"/>
+                </a:cubicBezTo>
+                <a:cubicBezTo>
+                  <a:pt x="2468880" y="567267"/>
+                  <a:pt x="2170853" y="504613"/>
+                  <a:pt x="1930400" y="467360"/>
+                </a:cubicBezTo>
+                <a:cubicBezTo>
+                  <a:pt x="1689947" y="430107"/>
+                  <a:pt x="1161627" y="472440"/>
+                  <a:pt x="1005840" y="406400"/>
+                </a:cubicBezTo>
+                <a:cubicBezTo>
+                  <a:pt x="850053" y="340360"/>
+                  <a:pt x="922867" y="138853"/>
+                  <a:pt x="995680" y="71120"/>
+                </a:cubicBezTo>
+                <a:cubicBezTo>
+                  <a:pt x="1068493" y="3387"/>
+                  <a:pt x="1442720" y="0"/>
+                  <a:pt x="1442720" y="0"/>
+                </a:cubicBezTo>
+              </a:path>
+            </a:pathLst>
+          </a:custGeom>
+          <a:ln>
+            <a:prstDash val="lgDash"/>
+          </a:ln>
+        </p:spPr>
+        <p:style>
+          <a:lnRef idx="1">
+            <a:schemeClr val="dk1"/>
+          </a:lnRef>
+          <a:fillRef idx="0">
+            <a:schemeClr val="dk1"/>
+          </a:fillRef>
+          <a:effectRef idx="0">
+            <a:schemeClr val="dk1"/>
+          </a:effectRef>
+          <a:fontRef idx="minor">
+            <a:schemeClr val="tx1"/>
+          </a:fontRef>
+        </p:style>
+        <p:txBody>
+          <a:bodyPr rtlCol="0" anchor="ctr"/>
+          <a:lstStyle/>
+          <a:p>
+            <a:pPr algn="ctr"/>
+            <a:endParaRPr lang="en-US"/>
+          </a:p>
+        </p:txBody>
+      </p:sp>
+      <p:sp>
+        <p:nvSpPr>
+          <p:cNvPr id="21" name="TextBox 20"/>
+          <p:cNvSpPr txBox="1"/>
+          <p:nvPr/>
+        </p:nvSpPr>
+        <p:spPr>
+          <a:xfrm>
+            <a:off x="5676440" y="3076376"/>
+            <a:ext cx="487680" cy="369332"/>
+          </a:xfrm>
+          <a:prstGeom prst="rect">
+            <a:avLst/>
+          </a:prstGeom>
+          <a:noFill/>
+        </p:spPr>
+        <p:txBody>
+          <a:bodyPr wrap="square" rtlCol="0">
+            <a:spAutoFit/>
+          </a:bodyPr>
+          <a:lstStyle/>
+          <a:p>
+            <a:r>
+              <a:rPr lang="en-US" dirty="0" smtClean="0"/>
+              <a:t>D</a:t>
+            </a:r>
+            <a:endParaRPr lang="en-US" dirty="0"/>
+          </a:p>
+        </p:txBody>
+      </p:sp>
+      <p:sp>
+        <p:nvSpPr>
+          <p:cNvPr id="33" name="Oval 32"/>
+          <p:cNvSpPr/>
+          <p:nvPr/>
+        </p:nvSpPr>
+        <p:spPr>
+          <a:xfrm>
+            <a:off x="7350582" y="2467477"/>
+            <a:ext cx="802640" cy="336683"/>
+          </a:xfrm>
+          <a:prstGeom prst="ellipse">
+            <a:avLst/>
+          </a:prstGeom>
+          <a:solidFill>
+            <a:schemeClr val="accent1">
+              <a:lumMod val="60000"/>
+              <a:lumOff val="40000"/>
+            </a:schemeClr>
+          </a:solidFill>
+        </p:spPr>
+        <p:style>
+          <a:lnRef idx="2">
+            <a:schemeClr val="dk1"/>
+          </a:lnRef>
+          <a:fillRef idx="1">
+            <a:schemeClr val="lt1"/>
+          </a:fillRef>
+          <a:effectRef idx="0">
+            <a:schemeClr val="dk1"/>
+          </a:effectRef>
+          <a:fontRef idx="minor">
+            <a:schemeClr val="dk1"/>
+          </a:fontRef>
+        </p:style>
+        <p:txBody>
+          <a:bodyPr rtlCol="0" anchor="ctr"/>
+          <a:lstStyle/>
+          <a:p>
+            <a:pPr algn="ctr"/>
+            <a:endParaRPr lang="en-US"/>
+          </a:p>
+        </p:txBody>
+      </p:sp>
+      <p:sp>
+        <p:nvSpPr>
+          <p:cNvPr id="34" name="TextBox 33"/>
+          <p:cNvSpPr txBox="1"/>
+          <p:nvPr/>
+        </p:nvSpPr>
+        <p:spPr>
+          <a:xfrm>
+            <a:off x="7177863" y="2804160"/>
+            <a:ext cx="1198880" cy="646331"/>
+          </a:xfrm>
+          <a:prstGeom prst="rect">
+            <a:avLst/>
+          </a:prstGeom>
+          <a:noFill/>
+        </p:spPr>
+        <p:txBody>
+          <a:bodyPr wrap="square" rtlCol="0">
+            <a:spAutoFit/>
+          </a:bodyPr>
+          <a:lstStyle/>
+          <a:p>
+            <a:pPr algn="ctr"/>
+            <a:r>
+              <a:rPr lang="en-US" dirty="0" smtClean="0"/>
+              <a:t>Data producer</a:t>
+            </a:r>
+            <a:endParaRPr lang="en-US" dirty="0"/>
+          </a:p>
+        </p:txBody>
+      </p:sp>
+      <p:sp>
+        <p:nvSpPr>
+          <p:cNvPr id="35" name="Freeform 34"/>
+          <p:cNvSpPr/>
+          <p:nvPr/>
+        </p:nvSpPr>
+        <p:spPr>
+          <a:xfrm>
+            <a:off x="6316520" y="2635108"/>
+            <a:ext cx="1023902" cy="252966"/>
+          </a:xfrm>
+          <a:custGeom>
+            <a:avLst/>
+            <a:gdLst>
+              <a:gd name="connsiteX0" fmla="*/ 0 w 1371600"/>
+              <a:gd name="connsiteY0" fmla="*/ 331612 h 688424"/>
+              <a:gd name="connsiteX1" fmla="*/ 294640 w 1371600"/>
+              <a:gd name="connsiteY1" fmla="*/ 687212 h 688424"/>
+              <a:gd name="connsiteX2" fmla="*/ 670560 w 1371600"/>
+              <a:gd name="connsiteY2" fmla="*/ 433212 h 688424"/>
+              <a:gd name="connsiteX3" fmla="*/ 995680 w 1371600"/>
+              <a:gd name="connsiteY3" fmla="*/ 47132 h 688424"/>
+              <a:gd name="connsiteX4" fmla="*/ 1371600 w 1371600"/>
+              <a:gd name="connsiteY4" fmla="*/ 6492 h 688424"/>
+            </a:gdLst>
+            <a:ahLst/>
+            <a:cxnLst>
+              <a:cxn ang="0">
+                <a:pos x="connsiteX0" y="connsiteY0"/>
+              </a:cxn>
+              <a:cxn ang="0">
+                <a:pos x="connsiteX1" y="connsiteY1"/>
+              </a:cxn>
+              <a:cxn ang="0">
+                <a:pos x="connsiteX2" y="connsiteY2"/>
+              </a:cxn>
+              <a:cxn ang="0">
+                <a:pos x="connsiteX3" y="connsiteY3"/>
+              </a:cxn>
+              <a:cxn ang="0">
+                <a:pos x="connsiteX4" y="connsiteY4"/>
+              </a:cxn>
+            </a:cxnLst>
+            <a:rect l="l" t="t" r="r" b="b"/>
+            <a:pathLst>
+              <a:path w="1371600" h="688424">
+                <a:moveTo>
+                  <a:pt x="0" y="331612"/>
+                </a:moveTo>
+                <a:cubicBezTo>
+                  <a:pt x="91440" y="500945"/>
+                  <a:pt x="182880" y="670279"/>
+                  <a:pt x="294640" y="687212"/>
+                </a:cubicBezTo>
+                <a:cubicBezTo>
+                  <a:pt x="406400" y="704145"/>
+                  <a:pt x="553720" y="539892"/>
+                  <a:pt x="670560" y="433212"/>
+                </a:cubicBezTo>
+                <a:cubicBezTo>
+                  <a:pt x="787400" y="326532"/>
+                  <a:pt x="878840" y="118252"/>
+                  <a:pt x="995680" y="47132"/>
+                </a:cubicBezTo>
+                <a:cubicBezTo>
+                  <a:pt x="1112520" y="-23988"/>
+                  <a:pt x="1371600" y="6492"/>
+                  <a:pt x="1371600" y="6492"/>
+                </a:cubicBezTo>
+              </a:path>
+            </a:pathLst>
+          </a:custGeom>
+          <a:ln>
+            <a:prstDash val="lgDash"/>
+          </a:ln>
+        </p:spPr>
+        <p:style>
+          <a:lnRef idx="1">
+            <a:schemeClr val="dk1"/>
+          </a:lnRef>
+          <a:fillRef idx="0">
+            <a:schemeClr val="dk1"/>
+          </a:fillRef>
+          <a:effectRef idx="0">
+            <a:schemeClr val="dk1"/>
+          </a:effectRef>
+          <a:fontRef idx="minor">
+            <a:schemeClr val="tx1"/>
+          </a:fontRef>
+        </p:style>
+        <p:txBody>
+          <a:bodyPr rtlCol="0" anchor="ctr"/>
+          <a:lstStyle/>
+          <a:p>
+            <a:pPr algn="ctr"/>
+            <a:endParaRPr lang="en-US"/>
+          </a:p>
+        </p:txBody>
+      </p:sp>
+      <p:sp>
+        <p:nvSpPr>
+          <p:cNvPr id="36" name="Rectangle 35"/>
+          <p:cNvSpPr/>
+          <p:nvPr/>
+        </p:nvSpPr>
+        <p:spPr>
+          <a:xfrm>
+            <a:off x="3034840" y="1432560"/>
+            <a:ext cx="924560" cy="608197"/>
+          </a:xfrm>
+          <a:prstGeom prst="rect">
+            <a:avLst/>
+          </a:prstGeom>
+        </p:spPr>
+        <p:style>
+          <a:lnRef idx="2">
+            <a:schemeClr val="dk1"/>
+          </a:lnRef>
+          <a:fillRef idx="1">
+            <a:schemeClr val="lt1"/>
+          </a:fillRef>
+          <a:effectRef idx="0">
+            <a:schemeClr val="dk1"/>
+          </a:effectRef>
+          <a:fontRef idx="minor">
+            <a:schemeClr val="dk1"/>
+          </a:fontRef>
+        </p:style>
+        <p:txBody>
+          <a:bodyPr rtlCol="0" anchor="ctr"/>
+          <a:lstStyle/>
+          <a:p>
+            <a:pPr algn="ctr"/>
+            <a:r>
+              <a:rPr lang="en-US" dirty="0" smtClean="0"/>
+              <a:t>NDN router </a:t>
+            </a:r>
+            <a:endParaRPr lang="en-US" dirty="0"/>
+          </a:p>
+        </p:txBody>
+      </p:sp>
+      <p:sp>
+        <p:nvSpPr>
+          <p:cNvPr id="37" name="TextBox 36"/>
+          <p:cNvSpPr txBox="1"/>
+          <p:nvPr/>
+        </p:nvSpPr>
+        <p:spPr>
+          <a:xfrm>
+            <a:off x="3319320" y="1979797"/>
+            <a:ext cx="487680" cy="369332"/>
+          </a:xfrm>
+          <a:prstGeom prst="rect">
+            <a:avLst/>
+          </a:prstGeom>
+          <a:noFill/>
+        </p:spPr>
+        <p:txBody>
+          <a:bodyPr wrap="square" rtlCol="0">
+            <a:spAutoFit/>
+          </a:bodyPr>
+          <a:lstStyle/>
+          <a:p>
+            <a:r>
+              <a:rPr lang="en-US" dirty="0" smtClean="0"/>
+              <a:t>L</a:t>
+            </a:r>
+            <a:endParaRPr lang="en-US" dirty="0"/>
+          </a:p>
+        </p:txBody>
+      </p:sp>
+      <p:sp>
+        <p:nvSpPr>
+          <p:cNvPr id="38" name="Rectangle 37"/>
+          <p:cNvSpPr/>
+          <p:nvPr/>
+        </p:nvSpPr>
+        <p:spPr>
+          <a:xfrm>
+            <a:off x="3034840" y="3598262"/>
+            <a:ext cx="924560" cy="608197"/>
+          </a:xfrm>
+          <a:prstGeom prst="rect">
+            <a:avLst/>
+          </a:prstGeom>
+        </p:spPr>
+        <p:style>
+          <a:lnRef idx="2">
+            <a:schemeClr val="dk1"/>
+          </a:lnRef>
+          <a:fillRef idx="1">
+            <a:schemeClr val="lt1"/>
+          </a:fillRef>
+          <a:effectRef idx="0">
+            <a:schemeClr val="dk1"/>
+          </a:effectRef>
+          <a:fontRef idx="minor">
+            <a:schemeClr val="dk1"/>
+          </a:fontRef>
+        </p:style>
+        <p:txBody>
+          <a:bodyPr rtlCol="0" anchor="ctr"/>
+          <a:lstStyle/>
+          <a:p>
+            <a:pPr algn="ctr"/>
+            <a:r>
+              <a:rPr lang="en-US" dirty="0" smtClean="0"/>
+              <a:t>NDN router </a:t>
+            </a:r>
+            <a:endParaRPr lang="en-US" dirty="0"/>
+          </a:p>
+        </p:txBody>
+      </p:sp>
+      <p:sp>
+        <p:nvSpPr>
+          <p:cNvPr id="39" name="TextBox 38"/>
+          <p:cNvSpPr txBox="1"/>
+          <p:nvPr/>
+        </p:nvSpPr>
+        <p:spPr>
+          <a:xfrm>
+            <a:off x="3319320" y="4154906"/>
+            <a:ext cx="487680" cy="369332"/>
+          </a:xfrm>
+          <a:prstGeom prst="rect">
+            <a:avLst/>
+          </a:prstGeom>
+          <a:noFill/>
+        </p:spPr>
+        <p:txBody>
+          <a:bodyPr wrap="square" rtlCol="0">
+            <a:spAutoFit/>
+          </a:bodyPr>
+          <a:lstStyle/>
+          <a:p>
+            <a:r>
+              <a:rPr lang="en-US" dirty="0"/>
+              <a:t>X</a:t>
+            </a:r>
+            <a:endParaRPr lang="en-US" dirty="0"/>
+          </a:p>
+        </p:txBody>
+      </p:sp>
+      <p:cxnSp>
+        <p:nvCxnSpPr>
+          <p:cNvPr id="15" name="Straight Connector 14"/>
+          <p:cNvCxnSpPr>
+            <a:endCxn id="36" idx="1"/>
+          </p:cNvCxnSpPr>
+          <p:nvPr/>
+        </p:nvCxnSpPr>
+        <p:spPr>
+          <a:xfrm>
+            <a:off x="2288268" y="1736659"/>
+            <a:ext cx="746572" cy="0"/>
+          </a:xfrm>
+          <a:prstGeom prst="line">
+            <a:avLst/>
+          </a:prstGeom>
+        </p:spPr>
+        <p:style>
+          <a:lnRef idx="1">
+            <a:schemeClr val="dk1"/>
+          </a:lnRef>
+          <a:fillRef idx="0">
+            <a:schemeClr val="dk1"/>
+          </a:fillRef>
+          <a:effectRef idx="0">
+            <a:schemeClr val="dk1"/>
+          </a:effectRef>
+          <a:fontRef idx="minor">
+            <a:schemeClr val="tx1"/>
+          </a:fontRef>
+        </p:style>
+      </p:cxnSp>
+      <p:cxnSp>
+        <p:nvCxnSpPr>
+          <p:cNvPr id="43" name="Straight Connector 42"/>
+          <p:cNvCxnSpPr/>
+          <p:nvPr/>
+        </p:nvCxnSpPr>
+        <p:spPr>
+          <a:xfrm>
+            <a:off x="2288268" y="3892837"/>
+            <a:ext cx="746572" cy="0"/>
+          </a:xfrm>
+          <a:prstGeom prst="line">
+            <a:avLst/>
+          </a:prstGeom>
+        </p:spPr>
+        <p:style>
+          <a:lnRef idx="1">
+            <a:schemeClr val="dk1"/>
+          </a:lnRef>
+          <a:fillRef idx="0">
+            <a:schemeClr val="dk1"/>
+          </a:fillRef>
+          <a:effectRef idx="0">
+            <a:schemeClr val="dk1"/>
+          </a:effectRef>
+          <a:fontRef idx="minor">
+            <a:schemeClr val="tx1"/>
+          </a:fontRef>
+        </p:style>
+      </p:cxnSp>
+      <p:sp>
+        <p:nvSpPr>
+          <p:cNvPr id="23" name="TextBox 22"/>
+          <p:cNvSpPr txBox="1"/>
+          <p:nvPr/>
+        </p:nvSpPr>
+        <p:spPr>
+          <a:xfrm>
+            <a:off x="3959401" y="1100662"/>
+            <a:ext cx="1976674" cy="369332"/>
+          </a:xfrm>
+          <a:prstGeom prst="rect">
+            <a:avLst/>
+          </a:prstGeom>
+          <a:noFill/>
+        </p:spPr>
+        <p:txBody>
+          <a:bodyPr wrap="square" rtlCol="0">
+            <a:spAutoFit/>
+          </a:bodyPr>
+          <a:lstStyle/>
+          <a:p>
+            <a:r>
+              <a:rPr lang="en-US" dirty="0" smtClean="0"/>
+              <a:t>1 forwarding token</a:t>
+            </a:r>
+            <a:endParaRPr lang="en-US" dirty="0"/>
+          </a:p>
+        </p:txBody>
+      </p:sp>
+      <p:sp>
+        <p:nvSpPr>
+          <p:cNvPr id="24" name="Oval 23"/>
+          <p:cNvSpPr/>
+          <p:nvPr/>
+        </p:nvSpPr>
+        <p:spPr>
+          <a:xfrm>
+            <a:off x="4054592" y="1469994"/>
+            <a:ext cx="188148" cy="188148"/>
+          </a:xfrm>
+          <a:prstGeom prst="ellipse">
+            <a:avLst/>
+          </a:prstGeom>
+        </p:spPr>
+        <p:style>
+          <a:lnRef idx="2">
+            <a:schemeClr val="accent1">
+              <a:shade val="50000"/>
+            </a:schemeClr>
+          </a:lnRef>
+          <a:fillRef idx="1">
+            <a:schemeClr val="accent1"/>
+          </a:fillRef>
+          <a:effectRef idx="0">
+            <a:schemeClr val="accent1"/>
+          </a:effectRef>
+          <a:fontRef idx="minor">
+            <a:schemeClr val="lt1"/>
+          </a:fontRef>
+        </p:style>
+        <p:txBody>
+          <a:bodyPr rtlCol="0" anchor="ctr"/>
+          <a:lstStyle/>
+          <a:p>
+            <a:pPr algn="ctr"/>
+            <a:endParaRPr lang="en-US"/>
+          </a:p>
+        </p:txBody>
+      </p:sp>
+      <p:sp>
+        <p:nvSpPr>
+          <p:cNvPr id="46" name="Oval 45"/>
+          <p:cNvSpPr/>
+          <p:nvPr/>
+        </p:nvSpPr>
+        <p:spPr>
+          <a:xfrm>
+            <a:off x="4018844" y="3834696"/>
+            <a:ext cx="188148" cy="188148"/>
+          </a:xfrm>
+          <a:prstGeom prst="ellipse">
+            <a:avLst/>
+          </a:prstGeom>
+        </p:spPr>
+        <p:style>
+          <a:lnRef idx="2">
+            <a:schemeClr val="accent1">
+              <a:shade val="50000"/>
+            </a:schemeClr>
+          </a:lnRef>
+          <a:fillRef idx="1">
+            <a:schemeClr val="accent1"/>
+          </a:fillRef>
+          <a:effectRef idx="0">
+            <a:schemeClr val="accent1"/>
+          </a:effectRef>
+          <a:fontRef idx="minor">
+            <a:schemeClr val="lt1"/>
+          </a:fontRef>
+        </p:style>
+        <p:txBody>
+          <a:bodyPr rtlCol="0" anchor="ctr"/>
+          <a:lstStyle/>
+          <a:p>
+            <a:pPr algn="ctr"/>
+            <a:endParaRPr lang="en-US"/>
+          </a:p>
+        </p:txBody>
+      </p:sp>
+      <p:sp>
+        <p:nvSpPr>
+          <p:cNvPr id="47" name="Oval 46"/>
+          <p:cNvSpPr/>
+          <p:nvPr/>
+        </p:nvSpPr>
+        <p:spPr>
+          <a:xfrm>
+            <a:off x="6408945" y="2547953"/>
+            <a:ext cx="188148" cy="188148"/>
+          </a:xfrm>
+          <a:prstGeom prst="ellipse">
+            <a:avLst/>
+          </a:prstGeom>
+        </p:spPr>
+        <p:style>
+          <a:lnRef idx="2">
+            <a:schemeClr val="accent1">
+              <a:shade val="50000"/>
+            </a:schemeClr>
+          </a:lnRef>
+          <a:fillRef idx="1">
+            <a:schemeClr val="accent1"/>
+          </a:fillRef>
+          <a:effectRef idx="0">
+            <a:schemeClr val="accent1"/>
+          </a:effectRef>
+          <a:fontRef idx="minor">
+            <a:schemeClr val="lt1"/>
+          </a:fontRef>
+        </p:style>
+        <p:txBody>
+          <a:bodyPr rtlCol="0" anchor="ctr"/>
+          <a:lstStyle/>
+          <a:p>
+            <a:pPr algn="ctr"/>
+            <a:endParaRPr lang="en-US"/>
+          </a:p>
+        </p:txBody>
+      </p:sp>
+    </p:spTree>
+    <p:extLst>
+      <p:ext uri="{BB962C8B-B14F-4D97-AF65-F5344CB8AC3E}">
+        <p14:creationId xmlns:p14="http://schemas.microsoft.com/office/powerpoint/2010/main" val="4143557525"/>
       </p:ext>
     </p:extLst>
   </p:cSld>

</xml_diff>